<commit_message>
update for final present
</commit_message>
<xml_diff>
--- a/Dino-AI .pptx
+++ b/Dino-AI .pptx
@@ -631,7 +631,7 @@
           <a:p>
             <a:fld id="{7171CAF3-24F7-4C16-8AD7-2A8939EBDF73}" type="datetimeFigureOut">
               <a:rPr lang="zh-TW" altLang="en-US" smtClean="0"/>
-              <a:t>2021/12/15</a:t>
+              <a:t>2022/1/14</a:t>
             </a:fld>
             <a:endParaRPr lang="zh-TW" altLang="en-US"/>
           </a:p>
@@ -833,7 +833,7 @@
           <a:p>
             <a:fld id="{7171CAF3-24F7-4C16-8AD7-2A8939EBDF73}" type="datetimeFigureOut">
               <a:rPr lang="zh-TW" altLang="en-US" smtClean="0"/>
-              <a:t>2021/12/15</a:t>
+              <a:t>2022/1/14</a:t>
             </a:fld>
             <a:endParaRPr lang="zh-TW" altLang="en-US"/>
           </a:p>
@@ -1013,7 +1013,7 @@
           <a:p>
             <a:fld id="{7171CAF3-24F7-4C16-8AD7-2A8939EBDF73}" type="datetimeFigureOut">
               <a:rPr lang="zh-TW" altLang="en-US" smtClean="0"/>
-              <a:t>2021/12/15</a:t>
+              <a:t>2022/1/14</a:t>
             </a:fld>
             <a:endParaRPr lang="zh-TW" altLang="en-US"/>
           </a:p>
@@ -1183,7 +1183,7 @@
           <a:p>
             <a:fld id="{7171CAF3-24F7-4C16-8AD7-2A8939EBDF73}" type="datetimeFigureOut">
               <a:rPr lang="zh-TW" altLang="en-US" smtClean="0"/>
-              <a:t>2021/12/15</a:t>
+              <a:t>2022/1/14</a:t>
             </a:fld>
             <a:endParaRPr lang="zh-TW" altLang="en-US"/>
           </a:p>
@@ -1754,7 +1754,7 @@
           <a:p>
             <a:fld id="{7171CAF3-24F7-4C16-8AD7-2A8939EBDF73}" type="datetimeFigureOut">
               <a:rPr lang="zh-TW" altLang="en-US" smtClean="0"/>
-              <a:t>2021/12/15</a:t>
+              <a:t>2022/1/14</a:t>
             </a:fld>
             <a:endParaRPr lang="zh-TW" altLang="en-US"/>
           </a:p>
@@ -2056,7 +2056,7 @@
           <a:p>
             <a:fld id="{7171CAF3-24F7-4C16-8AD7-2A8939EBDF73}" type="datetimeFigureOut">
               <a:rPr lang="zh-TW" altLang="en-US" smtClean="0"/>
-              <a:t>2021/12/15</a:t>
+              <a:t>2022/1/14</a:t>
             </a:fld>
             <a:endParaRPr lang="zh-TW" altLang="en-US"/>
           </a:p>
@@ -2498,7 +2498,7 @@
           <a:p>
             <a:fld id="{7171CAF3-24F7-4C16-8AD7-2A8939EBDF73}" type="datetimeFigureOut">
               <a:rPr lang="zh-TW" altLang="en-US" smtClean="0"/>
-              <a:t>2021/12/15</a:t>
+              <a:t>2022/1/14</a:t>
             </a:fld>
             <a:endParaRPr lang="zh-TW" altLang="en-US"/>
           </a:p>
@@ -2621,7 +2621,7 @@
           <a:p>
             <a:fld id="{7171CAF3-24F7-4C16-8AD7-2A8939EBDF73}" type="datetimeFigureOut">
               <a:rPr lang="zh-TW" altLang="en-US" smtClean="0"/>
-              <a:t>2021/12/15</a:t>
+              <a:t>2022/1/14</a:t>
             </a:fld>
             <a:endParaRPr lang="zh-TW" altLang="en-US"/>
           </a:p>
@@ -2716,7 +2716,7 @@
           <a:p>
             <a:fld id="{7171CAF3-24F7-4C16-8AD7-2A8939EBDF73}" type="datetimeFigureOut">
               <a:rPr lang="zh-TW" altLang="en-US" smtClean="0"/>
-              <a:t>2021/12/15</a:t>
+              <a:t>2022/1/14</a:t>
             </a:fld>
             <a:endParaRPr lang="zh-TW" altLang="en-US"/>
           </a:p>
@@ -3098,7 +3098,7 @@
           <a:p>
             <a:fld id="{7171CAF3-24F7-4C16-8AD7-2A8939EBDF73}" type="datetimeFigureOut">
               <a:rPr lang="zh-TW" altLang="en-US" smtClean="0"/>
-              <a:t>2021/12/15</a:t>
+              <a:t>2022/1/14</a:t>
             </a:fld>
             <a:endParaRPr lang="zh-TW" altLang="en-US"/>
           </a:p>
@@ -3497,7 +3497,7 @@
           <a:p>
             <a:fld id="{7171CAF3-24F7-4C16-8AD7-2A8939EBDF73}" type="datetimeFigureOut">
               <a:rPr lang="zh-TW" altLang="en-US" smtClean="0"/>
-              <a:t>2021/12/15</a:t>
+              <a:t>2022/1/14</a:t>
             </a:fld>
             <a:endParaRPr lang="zh-TW" altLang="en-US"/>
           </a:p>
@@ -3810,7 +3810,7 @@
           <a:p>
             <a:fld id="{7171CAF3-24F7-4C16-8AD7-2A8939EBDF73}" type="datetimeFigureOut">
               <a:rPr lang="zh-TW" altLang="en-US" smtClean="0"/>
-              <a:t>2021/12/15</a:t>
+              <a:t>2022/1/14</a:t>
             </a:fld>
             <a:endParaRPr lang="zh-TW" altLang="en-US"/>
           </a:p>
@@ -6712,13 +6712,13 @@
   <p:clrMapOvr>
     <a:masterClrMapping/>
   </p:clrMapOvr>
-  <mc:AlternateContent xmlns:mc="http://schemas.openxmlformats.org/markup-compatibility/2006">
-    <mc:Choice xmlns:p159="http://schemas.microsoft.com/office/powerpoint/2015/09/main" Requires="p159">
+  <mc:AlternateContent xmlns:mc="http://schemas.openxmlformats.org/markup-compatibility/2006" xmlns:p159="http://schemas.microsoft.com/office/powerpoint/2015/09/main">
+    <mc:Choice Requires="p159">
       <p:transition xmlns:p14="http://schemas.microsoft.com/office/powerpoint/2010/main" spd="slow" p14:dur="2000">
         <p159:morph option="byChar"/>
       </p:transition>
     </mc:Choice>
-    <mc:Fallback>
+    <mc:Fallback xmlns="">
       <p:transition spd="slow">
         <p:fade/>
       </p:transition>
@@ -7017,13 +7017,13 @@
   <p:clrMapOvr>
     <a:masterClrMapping/>
   </p:clrMapOvr>
-  <mc:AlternateContent xmlns:mc="http://schemas.openxmlformats.org/markup-compatibility/2006">
-    <mc:Choice xmlns:p14="http://schemas.microsoft.com/office/powerpoint/2010/main" Requires="p14">
+  <mc:AlternateContent xmlns:mc="http://schemas.openxmlformats.org/markup-compatibility/2006" xmlns:p14="http://schemas.microsoft.com/office/powerpoint/2010/main">
+    <mc:Choice Requires="p14">
       <p:transition spd="med" p14:dur="700">
         <p:fade/>
       </p:transition>
     </mc:Choice>
-    <mc:Fallback>
+    <mc:Fallback xmlns="">
       <p:transition spd="med">
         <p:fade/>
       </p:transition>
@@ -8531,9 +8531,9 @@
         <p:grpSpPr>
           <a:xfrm>
             <a:off x="2293246" y="3703031"/>
-            <a:ext cx="5317171" cy="2713847"/>
+            <a:ext cx="5317171" cy="2331442"/>
             <a:chOff x="3043383" y="3677194"/>
-            <a:chExt cx="5317171" cy="2713847"/>
+            <a:chExt cx="5317171" cy="2331442"/>
           </a:xfrm>
         </p:grpSpPr>
         <p:sp>
@@ -9494,118 +9494,7 @@
             </a:fontRef>
           </p:style>
         </p:cxnSp>
-        <p:sp>
-          <p:nvSpPr>
-            <p:cNvPr id="64" name="矩形 63">
-              <a:extLst>
-                <a:ext uri="{FF2B5EF4-FFF2-40B4-BE49-F238E27FC236}">
-                  <a16:creationId xmlns:a16="http://schemas.microsoft.com/office/drawing/2014/main" id="{2EACAF18-5B98-4499-B19A-18A14FE1745D}"/>
-                </a:ext>
-              </a:extLst>
-            </p:cNvPr>
-            <p:cNvSpPr/>
-            <p:nvPr/>
-          </p:nvSpPr>
-          <p:spPr>
-            <a:xfrm>
-              <a:off x="3043383" y="5961029"/>
-              <a:ext cx="1556022" cy="430012"/>
-            </a:xfrm>
-            <a:prstGeom prst="rect">
-              <a:avLst/>
-            </a:prstGeom>
-            <a:solidFill>
-              <a:srgbClr val="83B5C2"/>
-            </a:solidFill>
-            <a:ln>
-              <a:solidFill>
-                <a:schemeClr val="tx1"/>
-              </a:solidFill>
-            </a:ln>
-          </p:spPr>
-          <p:style>
-            <a:lnRef idx="2">
-              <a:schemeClr val="accent1">
-                <a:shade val="50000"/>
-              </a:schemeClr>
-            </a:lnRef>
-            <a:fillRef idx="1">
-              <a:schemeClr val="accent1"/>
-            </a:fillRef>
-            <a:effectRef idx="0">
-              <a:schemeClr val="accent1"/>
-            </a:effectRef>
-            <a:fontRef idx="minor">
-              <a:schemeClr val="lt1"/>
-            </a:fontRef>
-          </p:style>
-          <p:txBody>
-            <a:bodyPr rtlCol="0" anchor="ctr"/>
-            <a:lstStyle/>
-            <a:p>
-              <a:pPr algn="ctr"/>
-              <a:r>
-                <a:rPr lang="en-US" altLang="zh-TW" sz="1400" dirty="0" err="1">
-                  <a:solidFill>
-                    <a:schemeClr val="tx1"/>
-                  </a:solidFill>
-                  <a:latin typeface="Times New Roman" panose="02020603050405020304" pitchFamily="18" charset="0"/>
-                  <a:ea typeface="微軟正黑體" panose="020B0604030504040204" pitchFamily="34" charset="-120"/>
-                </a:rPr>
-                <a:t>dectect_game</a:t>
-              </a:r>
-              <a:endParaRPr lang="zh-TW" altLang="en-US" sz="1400" dirty="0">
-                <a:solidFill>
-                  <a:schemeClr val="tx1"/>
-                </a:solidFill>
-                <a:latin typeface="Times New Roman" panose="02020603050405020304" pitchFamily="18" charset="0"/>
-                <a:ea typeface="微軟正黑體" panose="020B0604030504040204" pitchFamily="34" charset="-120"/>
-              </a:endParaRPr>
-            </a:p>
-          </p:txBody>
-        </p:sp>
       </p:grpSp>
-      <p:cxnSp>
-        <p:nvCxnSpPr>
-          <p:cNvPr id="61" name="直線接點 60">
-            <a:extLst>
-              <a:ext uri="{FF2B5EF4-FFF2-40B4-BE49-F238E27FC236}">
-                <a16:creationId xmlns:a16="http://schemas.microsoft.com/office/drawing/2014/main" id="{DF793757-2E98-4BB1-AEBD-DD4FFFBA5C73}"/>
-              </a:ext>
-            </a:extLst>
-          </p:cNvPr>
-          <p:cNvCxnSpPr>
-            <a:cxnSpLocks/>
-            <a:stCxn id="5" idx="3"/>
-            <a:endCxn id="64" idx="1"/>
-          </p:cNvCxnSpPr>
-          <p:nvPr/>
-        </p:nvCxnSpPr>
-        <p:spPr>
-          <a:xfrm>
-            <a:off x="1632881" y="3165210"/>
-            <a:ext cx="660365" cy="3036662"/>
-          </a:xfrm>
-          <a:prstGeom prst="line">
-            <a:avLst/>
-          </a:prstGeom>
-          <a:ln w="38100"/>
-        </p:spPr>
-        <p:style>
-          <a:lnRef idx="1">
-            <a:schemeClr val="dk1"/>
-          </a:lnRef>
-          <a:fillRef idx="0">
-            <a:schemeClr val="dk1"/>
-          </a:fillRef>
-          <a:effectRef idx="0">
-            <a:schemeClr val="dk1"/>
-          </a:effectRef>
-          <a:fontRef idx="minor">
-            <a:schemeClr val="tx1"/>
-          </a:fontRef>
-        </p:style>
-      </p:cxnSp>
       <p:cxnSp>
         <p:nvCxnSpPr>
           <p:cNvPr id="57" name="直線接點 56">

</xml_diff>